<commit_message>
M5's marking guide and M5-2 slides uploaded
M5's marking guide and M5-2 slides uploaded
</commit_message>
<xml_diff>
--- a/Week09-10/M5_slides/Lab5_1.pptx
+++ b/Week09-10/M5_slides/Lab5_1.pptx
@@ -13,7 +13,7 @@
     <p:sldId id="279" r:id="rId4"/>
     <p:sldId id="275" r:id="rId5"/>
     <p:sldId id="276" r:id="rId6"/>
-    <p:sldId id="277" r:id="rId7"/>
+    <p:sldId id="303" r:id="rId7"/>
     <p:sldId id="265" r:id="rId8"/>
     <p:sldId id="300" r:id="rId9"/>
     <p:sldId id="301" r:id="rId10"/>
@@ -206,7 +206,7 @@
           <a:p>
             <a:fld id="{A9407A57-47BC-45C1-B9EB-906F4463B0AB}" type="datetimeFigureOut">
               <a:rPr lang="en-AU" smtClean="0"/>
-              <a:t>15/09/2024</a:t>
+              <a:t>25/09/2024</a:t>
             </a:fld>
             <a:endParaRPr lang="en-AU"/>
           </a:p>
@@ -642,7 +642,7 @@
           <a:p>
             <a:fld id="{1205BC88-DBF0-4610-A802-A09E0A6ECD22}" type="datetimeFigureOut">
               <a:rPr lang="en-AU" smtClean="0"/>
-              <a:t>15/09/2024</a:t>
+              <a:t>25/09/2024</a:t>
             </a:fld>
             <a:endParaRPr lang="en-AU"/>
           </a:p>
@@ -870,7 +870,7 @@
           <a:p>
             <a:fld id="{1205BC88-DBF0-4610-A802-A09E0A6ECD22}" type="datetimeFigureOut">
               <a:rPr lang="en-AU" smtClean="0"/>
-              <a:t>15/09/2024</a:t>
+              <a:t>25/09/2024</a:t>
             </a:fld>
             <a:endParaRPr lang="en-AU"/>
           </a:p>
@@ -1050,7 +1050,7 @@
           <a:p>
             <a:fld id="{1205BC88-DBF0-4610-A802-A09E0A6ECD22}" type="datetimeFigureOut">
               <a:rPr lang="en-AU" smtClean="0"/>
-              <a:t>15/09/2024</a:t>
+              <a:t>25/09/2024</a:t>
             </a:fld>
             <a:endParaRPr lang="en-AU"/>
           </a:p>
@@ -1220,7 +1220,7 @@
           <a:p>
             <a:fld id="{1205BC88-DBF0-4610-A802-A09E0A6ECD22}" type="datetimeFigureOut">
               <a:rPr lang="en-AU" smtClean="0"/>
-              <a:t>15/09/2024</a:t>
+              <a:t>25/09/2024</a:t>
             </a:fld>
             <a:endParaRPr lang="en-AU"/>
           </a:p>
@@ -1474,7 +1474,7 @@
           <a:p>
             <a:fld id="{1205BC88-DBF0-4610-A802-A09E0A6ECD22}" type="datetimeFigureOut">
               <a:rPr lang="en-AU" smtClean="0"/>
-              <a:t>15/09/2024</a:t>
+              <a:t>25/09/2024</a:t>
             </a:fld>
             <a:endParaRPr lang="en-AU"/>
           </a:p>
@@ -1800,7 +1800,7 @@
           <a:p>
             <a:fld id="{1205BC88-DBF0-4610-A802-A09E0A6ECD22}" type="datetimeFigureOut">
               <a:rPr lang="en-AU" smtClean="0"/>
-              <a:t>15/09/2024</a:t>
+              <a:t>25/09/2024</a:t>
             </a:fld>
             <a:endParaRPr lang="en-AU"/>
           </a:p>
@@ -2251,7 +2251,7 @@
           <a:p>
             <a:fld id="{1205BC88-DBF0-4610-A802-A09E0A6ECD22}" type="datetimeFigureOut">
               <a:rPr lang="en-AU" smtClean="0"/>
-              <a:t>15/09/2024</a:t>
+              <a:t>25/09/2024</a:t>
             </a:fld>
             <a:endParaRPr lang="en-AU"/>
           </a:p>
@@ -2369,7 +2369,7 @@
           <a:p>
             <a:fld id="{1205BC88-DBF0-4610-A802-A09E0A6ECD22}" type="datetimeFigureOut">
               <a:rPr lang="en-AU" smtClean="0"/>
-              <a:t>15/09/2024</a:t>
+              <a:t>25/09/2024</a:t>
             </a:fld>
             <a:endParaRPr lang="en-AU"/>
           </a:p>
@@ -2464,7 +2464,7 @@
           <a:p>
             <a:fld id="{1205BC88-DBF0-4610-A802-A09E0A6ECD22}" type="datetimeFigureOut">
               <a:rPr lang="en-AU" smtClean="0"/>
-              <a:t>15/09/2024</a:t>
+              <a:t>25/09/2024</a:t>
             </a:fld>
             <a:endParaRPr lang="en-AU"/>
           </a:p>
@@ -2751,7 +2751,7 @@
           <a:p>
             <a:fld id="{1205BC88-DBF0-4610-A802-A09E0A6ECD22}" type="datetimeFigureOut">
               <a:rPr lang="en-AU" smtClean="0"/>
-              <a:t>15/09/2024</a:t>
+              <a:t>25/09/2024</a:t>
             </a:fld>
             <a:endParaRPr lang="en-AU"/>
           </a:p>
@@ -3073,7 +3073,7 @@
           <a:p>
             <a:fld id="{1205BC88-DBF0-4610-A802-A09E0A6ECD22}" type="datetimeFigureOut">
               <a:rPr lang="en-AU" smtClean="0"/>
-              <a:t>15/09/2024</a:t>
+              <a:t>25/09/2024</a:t>
             </a:fld>
             <a:endParaRPr lang="en-AU"/>
           </a:p>
@@ -3327,7 +3327,7 @@
           <a:p>
             <a:fld id="{1205BC88-DBF0-4610-A802-A09E0A6ECD22}" type="datetimeFigureOut">
               <a:rPr lang="en-AU" smtClean="0"/>
-              <a:t>15/09/2024</a:t>
+              <a:t>25/09/2024</a:t>
             </a:fld>
             <a:endParaRPr lang="en-AU"/>
           </a:p>
@@ -7217,7 +7217,7 @@
             </a:pPr>
             <a:r>
               <a:rPr lang="en-US" dirty="0"/>
-              <a:t>Arena mapping: 40pts</a:t>
+              <a:t>Arena mapping: 60pts</a:t>
             </a:r>
           </a:p>
           <a:p>
@@ -7227,7 +7227,7 @@
             </a:pPr>
             <a:r>
               <a:rPr lang="en-US" dirty="0"/>
-              <a:t>SLAM map: 20pts</a:t>
+              <a:t>SLAM map: 30pts</a:t>
             </a:r>
           </a:p>
           <a:p>
@@ -7237,7 +7237,7 @@
             </a:pPr>
             <a:r>
               <a:rPr lang="en-US" dirty="0"/>
-              <a:t>Target map: 20pts</a:t>
+              <a:t>Target map: 30pts</a:t>
             </a:r>
           </a:p>
           <a:p>
@@ -7247,7 +7247,7 @@
             </a:pPr>
             <a:r>
               <a:rPr lang="en-US" dirty="0"/>
-              <a:t>Grocery shopping / navigation: 60pts</a:t>
+              <a:t>Grocery shopping / navigation: 40pts</a:t>
             </a:r>
           </a:p>
           <a:p>
@@ -7257,7 +7257,7 @@
             </a:pPr>
             <a:r>
               <a:rPr lang="en-US" dirty="0"/>
-              <a:t>Semi-auto waypoint navigation: 10pts</a:t>
+              <a:t>Semi-auto waypoint navigation: max 15pts</a:t>
             </a:r>
           </a:p>
           <a:p>
@@ -7267,7 +7267,7 @@
             </a:pPr>
             <a:r>
               <a:rPr lang="en-US" dirty="0"/>
-              <a:t>Full auto navigation: 50pts</a:t>
+              <a:t>Full auto navigation: max 40pts</a:t>
             </a:r>
           </a:p>
           <a:p>
@@ -7594,7 +7594,7 @@
             <p:spPr>
               <a:xfrm>
                 <a:off x="478180" y="723232"/>
-                <a:ext cx="11588314" cy="6147773"/>
+                <a:ext cx="11588314" cy="5830699"/>
               </a:xfrm>
               <a:prstGeom prst="rect">
                 <a:avLst/>
@@ -7608,50 +7608,62 @@
               <a:lstStyle/>
               <a:p>
                 <a:r>
-                  <a:rPr lang="en-US" dirty="0"/>
-                  <a:t>Mapping (40 points):</a:t>
+                  <a:rPr lang="en-US" sz="1600" dirty="0"/>
+                  <a:t>Mapping (60 points):</a:t>
                 </a:r>
               </a:p>
               <a:p>
                 <a:r>
-                  <a:rPr lang="en-US" dirty="0"/>
+                  <a:rPr lang="en-US" sz="1600" dirty="0"/>
                   <a:t>	</a:t>
                 </a:r>
                 <a:r>
-                  <a:rPr lang="en-US" dirty="0" err="1"/>
+                  <a:rPr lang="en-US" sz="1600" dirty="0" err="1"/>
                   <a:t>ArUco</a:t>
                 </a:r>
                 <a:r>
-                  <a:rPr lang="en-US" dirty="0"/>
+                  <a:rPr lang="en-US" sz="1600" dirty="0"/>
                   <a:t> slam map (0 ≤ </a:t>
                 </a:r>
                 <a:r>
-                  <a:rPr lang="en-US" dirty="0" err="1"/>
+                  <a:rPr lang="en-US" sz="1600" dirty="0" err="1"/>
                   <a:t>slam_score</a:t>
                 </a:r>
                 <a:r>
-                  <a:rPr lang="en-US" dirty="0"/>
-                  <a:t> ≤ 20pt): </a:t>
+                  <a:rPr lang="en-US" sz="1600" dirty="0"/>
+                  <a:t> ≤ 30pt): </a:t>
                 </a:r>
               </a:p>
               <a:p>
                 <a:pPr algn="ctr"/>
                 <a:r>
-                  <a:rPr lang="en-US" dirty="0"/>
+                  <a:rPr lang="en-US" sz="1600" dirty="0"/>
                   <a:t>		</a:t>
                 </a:r>
                 <a14:m>
                   <m:oMath xmlns:m="http://schemas.openxmlformats.org/officeDocument/2006/math">
                     <m:r>
-                      <a:rPr lang="en-US" b="0" i="1" smtClean="0">
+                      <a:rPr lang="en-US" sz="1600" i="1">
                         <a:latin typeface="Cambria Math" panose="02040503050406030204" pitchFamily="18" charset="0"/>
                       </a:rPr>
-                      <m:t>16∗</m:t>
+                      <m:t>2</m:t>
+                    </m:r>
+                    <m:r>
+                      <a:rPr lang="en-AU" sz="1600" b="0" i="1" smtClean="0">
+                        <a:latin typeface="Cambria Math" panose="02040503050406030204" pitchFamily="18" charset="0"/>
+                      </a:rPr>
+                      <m:t>4</m:t>
+                    </m:r>
+                    <m:r>
+                      <a:rPr lang="en-US" sz="1600" b="0" i="1" smtClean="0">
+                        <a:latin typeface="Cambria Math" panose="02040503050406030204" pitchFamily="18" charset="0"/>
+                      </a:rPr>
+                      <m:t>∗</m:t>
                     </m:r>
                     <m:f>
                       <m:fPr>
                         <m:ctrlPr>
-                          <a:rPr lang="en-US" i="1" smtClean="0">
+                          <a:rPr lang="en-US" sz="1600" i="1" smtClean="0">
                             <a:latin typeface="Cambria Math" panose="02040503050406030204" pitchFamily="18" charset="0"/>
                           </a:rPr>
                         </m:ctrlPr>
@@ -7661,42 +7673,42 @@
                           <m:rPr>
                             <m:nor/>
                           </m:rPr>
-                          <a:rPr lang="en-GB" b="0" i="0" dirty="0" smtClean="0"/>
+                          <a:rPr lang="en-GB" sz="1600" b="0" i="0" dirty="0" smtClean="0"/>
                           <m:t>0.12</m:t>
                         </m:r>
                         <m:r>
                           <m:rPr>
                             <m:nor/>
                           </m:rPr>
-                          <a:rPr lang="en-AU" b="0" i="0" dirty="0" smtClean="0"/>
+                          <a:rPr lang="en-AU" sz="1600" b="0" i="0" dirty="0" smtClean="0"/>
                           <m:t> </m:t>
                         </m:r>
                         <m:r>
                           <m:rPr>
                             <m:nor/>
                           </m:rPr>
-                          <a:rPr lang="en-US" dirty="0"/>
+                          <a:rPr lang="en-US" sz="1600" dirty="0"/>
                           <m:t>− </m:t>
                         </m:r>
                         <m:r>
                           <m:rPr>
                             <m:nor/>
                           </m:rPr>
-                          <a:rPr lang="en-US" dirty="0"/>
+                          <a:rPr lang="en-US" sz="1600" dirty="0"/>
                           <m:t>Aligned</m:t>
                         </m:r>
                         <m:r>
                           <m:rPr>
                             <m:nor/>
                           </m:rPr>
-                          <a:rPr lang="en-US" dirty="0"/>
+                          <a:rPr lang="en-US" sz="1600" dirty="0"/>
                           <m:t>_</m:t>
                         </m:r>
                         <m:r>
                           <m:rPr>
                             <m:nor/>
                           </m:rPr>
-                          <a:rPr lang="en-US" dirty="0"/>
+                          <a:rPr lang="en-US" sz="1600" dirty="0"/>
                           <m:t>RMSE</m:t>
                         </m:r>
                       </m:num>
@@ -7705,14 +7717,14 @@
                           <m:rPr>
                             <m:nor/>
                           </m:rPr>
-                          <a:rPr lang="en-GB" b="0" i="0" dirty="0" smtClean="0"/>
+                          <a:rPr lang="en-GB" sz="1600" b="0" i="0" dirty="0" smtClean="0"/>
                           <m:t>0.12</m:t>
                         </m:r>
                         <m:r>
                           <m:rPr>
                             <m:nor/>
                           </m:rPr>
-                          <a:rPr lang="en-US" dirty="0"/>
+                          <a:rPr lang="en-US" sz="1600" dirty="0"/>
                           <m:t>− 0.02</m:t>
                         </m:r>
                       </m:den>
@@ -7721,99 +7733,101 @@
                       <m:rPr>
                         <m:nor/>
                       </m:rPr>
-                      <a:rPr lang="en-US" dirty="0"/>
-                      <m:t>+ </m:t>
-                    </m:r>
-                    <m:r>
-                      <m:rPr>
-                        <m:nor/>
-                      </m:rPr>
-                      <a:rPr lang="en-US" b="0" i="0" dirty="0" smtClean="0"/>
-                      <m:t>0.4 ∗ </m:t>
-                    </m:r>
-                    <m:r>
-                      <m:rPr>
-                        <m:nor/>
-                      </m:rPr>
-                      <a:rPr lang="en-US" dirty="0"/>
-                      <m:t>NumberOfFoundMarkers</m:t>
-                    </m:r>
-                    <m:r>
-                      <m:rPr>
-                        <m:nor/>
-                      </m:rPr>
-                      <a:rPr lang="en-US" dirty="0"/>
+                      <a:rPr lang="en-AU" sz="1600" b="0" i="0" dirty="0" smtClean="0">
+                        <a:latin typeface="Cambria Math" panose="02040503050406030204" pitchFamily="18" charset="0"/>
+                      </a:rPr>
                       <m:t> </m:t>
                     </m:r>
                     <m:r>
                       <m:rPr>
                         <m:nor/>
                       </m:rPr>
-                      <a:rPr lang="en-GB" b="0" i="0" dirty="0" smtClean="0"/>
-                      <m:t>− </m:t>
+                      <a:rPr lang="en-US" sz="1600" dirty="0"/>
+                      <m:t>+</m:t>
                     </m:r>
                     <m:r>
                       <m:rPr>
                         <m:nor/>
                       </m:rPr>
-                      <a:rPr lang="en-GB" b="0" i="0" dirty="0" smtClean="0"/>
-                      <m:t>Penalty</m:t>
+                      <a:rPr lang="en-AU" sz="1600" b="0" i="0" dirty="0" smtClean="0"/>
+                      <m:t> </m:t>
+                    </m:r>
+                    <m:r>
+                      <m:rPr>
+                        <m:nor/>
+                      </m:rPr>
+                      <a:rPr lang="en-US" sz="1600" b="0" i="0" dirty="0" smtClean="0"/>
+                      <m:t>0.</m:t>
+                    </m:r>
+                    <m:r>
+                      <m:rPr>
+                        <m:nor/>
+                      </m:rPr>
+                      <a:rPr lang="en-AU" sz="1600" b="0" i="0" dirty="0" smtClean="0"/>
+                      <m:t>6</m:t>
+                    </m:r>
+                    <m:r>
+                      <m:rPr>
+                        <m:nor/>
+                      </m:rPr>
+                      <a:rPr lang="en-US" sz="1600" b="0" i="0" dirty="0" smtClean="0"/>
+                      <m:t> ∗ </m:t>
+                    </m:r>
+                    <m:r>
+                      <m:rPr>
+                        <m:nor/>
+                      </m:rPr>
+                      <a:rPr lang="en-US" sz="1600" dirty="0"/>
+                      <m:t>NumberOfFoundMarkers</m:t>
                     </m:r>
                   </m:oMath>
                 </a14:m>
-                <a:endParaRPr lang="en-US" sz="2000" dirty="0"/>
-              </a:p>
-              <a:p>
-                <a:pPr algn="ctr"/>
-                <a:br>
-                  <a:rPr lang="en-US" sz="1400" dirty="0"/>
-                </a:br>
-                <a:endParaRPr lang="en-US" sz="1400" dirty="0"/>
+                <a:endParaRPr lang="en-US" sz="1200" dirty="0"/>
               </a:p>
               <a:p>
                 <a:r>
-                  <a:rPr lang="en-US" dirty="0"/>
+                  <a:rPr lang="en-US" sz="1600" dirty="0"/>
                   <a:t>	Target map (0 ≤ </a:t>
                 </a:r>
                 <a:r>
-                  <a:rPr lang="en-US" dirty="0" err="1"/>
+                  <a:rPr lang="en-US" sz="1600" dirty="0" err="1"/>
                   <a:t>target_est_score</a:t>
                 </a:r>
                 <a:r>
-                  <a:rPr lang="en-US" dirty="0"/>
-                  <a:t> ≤ 20pt):</a:t>
+                  <a:rPr lang="en-US" sz="1600" dirty="0"/>
+                  <a:t> ≤ 30pt):</a:t>
                 </a:r>
               </a:p>
               <a:p>
                 <a:pPr algn="ctr"/>
                 <a:r>
-                  <a:rPr lang="en-US" dirty="0"/>
-                  <a:t>		 </a:t>
+                  <a:rPr lang="en-US" sz="1600" dirty="0"/>
+                  <a:t>	</a:t>
                 </a:r>
                 <a:r>
-                  <a:rPr lang="en-US" dirty="0" err="1"/>
+                  <a:rPr lang="en-US" sz="1600" dirty="0" err="1"/>
                   <a:t>TargetScore</a:t>
                 </a:r>
                 <a:r>
-                  <a:rPr lang="en-US" dirty="0"/>
+                  <a:rPr lang="en-US" sz="1600" dirty="0"/>
                   <a:t>[object] </a:t>
                 </a:r>
                 <a14:m>
                   <m:oMath xmlns:m="http://schemas.openxmlformats.org/officeDocument/2006/math">
                     <m:r>
-                      <a:rPr lang="en-GB" b="0" i="0" smtClean="0">
+                      <a:rPr lang="en-GB" sz="1600" b="0" i="0" smtClean="0">
                         <a:latin typeface="Cambria Math" panose="02040503050406030204" pitchFamily="18" charset="0"/>
                       </a:rPr>
                       <m:t>=</m:t>
                     </m:r>
                     <m:r>
-                      <a:rPr lang="en-GB" b="0" i="1" smtClean="0">
+                      <a:rPr lang="en-AU" sz="1600" b="0" i="1" smtClean="0">
                         <a:latin typeface="Cambria Math" panose="02040503050406030204" pitchFamily="18" charset="0"/>
                       </a:rPr>
-                      <m:t>2</m:t>
+                      <m:t>3</m:t>
                     </m:r>
                     <m:r>
-                      <a:rPr lang="en-US" b="0" i="1" smtClean="0">
+                      <a:rPr lang="en-US" sz="1600" b="0" i="1" smtClean="0">
                         <a:latin typeface="Cambria Math" panose="02040503050406030204" pitchFamily="18" charset="0"/>
                       </a:rPr>
                       <m:t>∗</m:t>
@@ -7821,7 +7835,7 @@
                     <m:f>
                       <m:fPr>
                         <m:ctrlPr>
-                          <a:rPr lang="en-US" i="1" smtClean="0">
+                          <a:rPr lang="en-US" sz="1600" i="1" smtClean="0">
                             <a:latin typeface="Cambria Math" panose="02040503050406030204" pitchFamily="18" charset="0"/>
                           </a:rPr>
                         </m:ctrlPr>
@@ -7831,7 +7845,7 @@
                           <m:rPr>
                             <m:nor/>
                           </m:rPr>
-                          <a:rPr lang="en-US" b="0" i="0" smtClean="0">
+                          <a:rPr lang="en-US" sz="1600" b="0" i="0" smtClean="0">
                             <a:latin typeface="Cambria Math" panose="02040503050406030204" pitchFamily="18" charset="0"/>
                           </a:rPr>
                           <m:t>1</m:t>
@@ -7840,7 +7854,7 @@
                           <m:rPr>
                             <m:nor/>
                           </m:rPr>
-                          <a:rPr lang="en-AU" b="0" i="0" smtClean="0">
+                          <a:rPr lang="en-AU" sz="1600" b="0" i="0" smtClean="0">
                             <a:latin typeface="Cambria Math" panose="02040503050406030204" pitchFamily="18" charset="0"/>
                           </a:rPr>
                           <m:t> </m:t>
@@ -7849,56 +7863,56 @@
                           <m:rPr>
                             <m:nor/>
                           </m:rPr>
-                          <a:rPr lang="en-US" dirty="0"/>
+                          <a:rPr lang="en-US" sz="1600" dirty="0"/>
                           <m:t>−</m:t>
                         </m:r>
                         <m:r>
                           <m:rPr>
                             <m:nor/>
                           </m:rPr>
-                          <a:rPr lang="en-AU" b="0" i="0" dirty="0" smtClean="0"/>
+                          <a:rPr lang="en-AU" sz="1600" b="0" i="0" dirty="0" smtClean="0"/>
                           <m:t> </m:t>
                         </m:r>
                         <m:r>
                           <m:rPr>
                             <m:nor/>
                           </m:rPr>
-                          <a:rPr lang="en-US" dirty="0"/>
+                          <a:rPr lang="en-US" sz="1600" dirty="0"/>
                           <m:t>estimation</m:t>
                         </m:r>
                         <m:r>
                           <m:rPr>
                             <m:nor/>
                           </m:rPr>
-                          <a:rPr lang="en-US" dirty="0"/>
+                          <a:rPr lang="en-US" sz="1600" dirty="0"/>
                           <m:t>_</m:t>
                         </m:r>
                         <m:r>
                           <m:rPr>
                             <m:nor/>
                           </m:rPr>
-                          <a:rPr lang="en-US" dirty="0"/>
+                          <a:rPr lang="en-US" sz="1600" dirty="0"/>
                           <m:t>error</m:t>
                         </m:r>
                         <m:r>
                           <m:rPr>
                             <m:nor/>
                           </m:rPr>
-                          <a:rPr lang="en-GB" b="0" i="0" dirty="0" smtClean="0"/>
+                          <a:rPr lang="en-GB" sz="1600" b="0" i="0" dirty="0" smtClean="0"/>
                           <m:t>[</m:t>
                         </m:r>
                         <m:r>
                           <m:rPr>
                             <m:nor/>
                           </m:rPr>
-                          <a:rPr lang="en-GB" b="0" i="0" dirty="0" smtClean="0"/>
+                          <a:rPr lang="en-GB" sz="1600" b="0" i="0" dirty="0" smtClean="0"/>
                           <m:t>object</m:t>
                         </m:r>
                         <m:r>
                           <m:rPr>
                             <m:nor/>
                           </m:rPr>
-                          <a:rPr lang="en-GB" b="0" i="0" dirty="0" smtClean="0"/>
+                          <a:rPr lang="en-GB" sz="1600" b="0" i="0" dirty="0" smtClean="0"/>
                           <m:t>]</m:t>
                         </m:r>
                       </m:num>
@@ -7907,109 +7921,125 @@
                           <m:rPr>
                             <m:nor/>
                           </m:rPr>
-                          <a:rPr lang="en-US" b="0" i="0" dirty="0" smtClean="0"/>
+                          <a:rPr lang="en-US" sz="1600" b="0" i="0" dirty="0" smtClean="0"/>
                           <m:t>1 − 0.025</m:t>
                         </m:r>
                       </m:den>
                     </m:f>
                   </m:oMath>
                 </a14:m>
-                <a:endParaRPr lang="en-US" dirty="0"/>
+                <a:endParaRPr lang="en-US" sz="1600" dirty="0"/>
               </a:p>
               <a:p>
                 <a:pPr algn="ctr"/>
                 <a:r>
-                  <a:rPr lang="en-US" dirty="0" err="1"/>
+                  <a:rPr lang="en-US" sz="1600" dirty="0" err="1"/>
                   <a:t>TargetEstScore</a:t>
                 </a:r>
                 <a:r>
-                  <a:rPr lang="en-US" dirty="0"/>
+                  <a:rPr lang="en-US" sz="1600" dirty="0"/>
                   <a:t> = sum(</a:t>
                 </a:r>
                 <a:r>
-                  <a:rPr lang="en-US" dirty="0" err="1"/>
+                  <a:rPr lang="en-US" sz="1600" dirty="0" err="1"/>
                   <a:t>TargetScore</a:t>
                 </a:r>
                 <a:r>
-                  <a:rPr lang="en-US" dirty="0"/>
-                  <a:t>) – Penalty</a:t>
-                </a:r>
-              </a:p>
-              <a:p>
-                <a:pPr algn="ctr"/>
-                <a:endParaRPr lang="en-US" dirty="0"/>
-              </a:p>
-              <a:p>
-                <a:r>
-                  <a:rPr lang="en-US" dirty="0"/>
-                  <a:t>Waypoint navigation (10 points):</a:t>
+                  <a:rPr lang="en-US" sz="1600" dirty="0"/>
+                  <a:t>)</a:t>
                 </a:r>
               </a:p>
               <a:p>
                 <a:r>
-                  <a:rPr lang="en-US" dirty="0"/>
-                  <a:t>	If you can achieve a qualified run using semi-auto waypoint </a:t>
+                  <a:rPr lang="en-US" sz="1600" dirty="0"/>
+                  <a:t>	Mapping score (0 ≤ </a:t>
                 </a:r>
                 <a:r>
-                  <a:rPr lang="en-US" dirty="0" err="1"/>
-                  <a:t>navigtion</a:t>
+                  <a:rPr lang="en-US" sz="1600" dirty="0" err="1"/>
+                  <a:t>map_score</a:t>
                 </a:r>
                 <a:r>
-                  <a:rPr lang="en-US" dirty="0"/>
-                  <a:t> and there is code evidence,</a:t>
+                  <a:rPr lang="en-US" sz="1600" dirty="0"/>
+                  <a:t> ≤ 60pt) = </a:t>
+                </a:r>
+                <a:r>
+                  <a:rPr lang="en-US" sz="1600" dirty="0" err="1"/>
+                  <a:t>slam_score</a:t>
+                </a:r>
+                <a:r>
+                  <a:rPr lang="en-US" sz="1600" dirty="0"/>
+                  <a:t> + </a:t>
+                </a:r>
+                <a:r>
+                  <a:rPr lang="en-US" sz="1600" dirty="0" err="1"/>
+                  <a:t>target_est_score</a:t>
+                </a:r>
+                <a:endParaRPr lang="en-US" sz="1600" dirty="0"/>
+              </a:p>
+              <a:p>
+                <a:r>
+                  <a:rPr lang="en-US" sz="1600" dirty="0"/>
+                  <a:t>Waypoint navigation (max 15 points):</a:t>
                 </a:r>
               </a:p>
               <a:p>
                 <a:r>
-                  <a:rPr lang="en-US" dirty="0"/>
-                  <a:t>	or if you can achieve a qualified run using full auto navigation and there is code evidence,</a:t>
+                  <a:rPr lang="en-US" sz="1600" dirty="0"/>
+                  <a:t>	2pts for each success navigation. 5pts for code or demo evidence.</a:t>
+                </a:r>
+              </a:p>
+              <a:p>
+                <a:endParaRPr lang="en-US" sz="1600" dirty="0"/>
+              </a:p>
+              <a:p>
+                <a:r>
+                  <a:rPr lang="en-US" sz="1600" dirty="0"/>
+                  <a:t>Full auto navigation (max 40 points):</a:t>
                 </a:r>
               </a:p>
               <a:p>
                 <a:r>
-                  <a:rPr lang="en-US" dirty="0"/>
-                  <a:t>	you will receive 10 points</a:t>
-                </a:r>
-              </a:p>
-              <a:p>
-                <a:endParaRPr lang="en-US" dirty="0"/>
-              </a:p>
-              <a:p>
-                <a:r>
-                  <a:rPr lang="en-US" dirty="0"/>
-                  <a:t>Full auto navigation (50 points):</a:t>
+                  <a:rPr lang="en-US" sz="1600" dirty="0"/>
+                  <a:t>	6pts for each success navigation. 10pts total for code or demo evidence (includes 5 pts for waypoint navigation and 5 pts for path planning).</a:t>
                 </a:r>
               </a:p>
               <a:p>
                 <a:r>
-                  <a:rPr lang="en-US" dirty="0"/>
-                  <a:t>	10pt for each target you successfully navigate to in a qualified full auto navigation run</a:t>
-                </a:r>
-              </a:p>
-              <a:p>
-                <a:r>
-                  <a:rPr lang="en-US" dirty="0"/>
+                  <a:rPr lang="en-US" sz="1600" dirty="0"/>
                   <a:t>	</a:t>
                 </a:r>
               </a:p>
               <a:p>
                 <a:r>
-                  <a:rPr lang="en-US" dirty="0"/>
-                  <a:t>Penalties (Max of 5 penalties):</a:t>
+                  <a:rPr lang="en-US" sz="1600" dirty="0"/>
+                  <a:t>Penalties (Max of 5 penalties total, 4 applied):</a:t>
                 </a:r>
               </a:p>
               <a:p>
                 <a:r>
-                  <a:rPr lang="en-US" dirty="0"/>
-                  <a:t>	-5 points for collision, -5 points for exceeding boundary</a:t>
+                  <a:rPr lang="en-US" sz="1600"/>
+                  <a:t>	-3 </a:t>
+                </a:r>
+                <a:r>
+                  <a:rPr lang="en-US" sz="1600" dirty="0"/>
+                  <a:t>(or -2 if you perform semi auto navigation) points for object collisions or leaving boundary (Does not apply to evidence marks)</a:t>
                 </a:r>
               </a:p>
               <a:p>
-                <a:endParaRPr lang="en-US" dirty="0"/>
+                <a:endParaRPr lang="en-US" sz="1600" dirty="0"/>
               </a:p>
               <a:p>
                 <a:r>
-                  <a:rPr lang="en-US" dirty="0"/>
+                  <a:rPr lang="en-US" sz="1600" dirty="0"/>
+                  <a:t>Marks for reaching objects will always count, however you cannot stop a run manually until a run is qualified (same definition as M4)</a:t>
+                </a:r>
+              </a:p>
+              <a:p>
+                <a:endParaRPr lang="en-US" sz="1600" dirty="0"/>
+              </a:p>
+              <a:p>
+                <a:r>
+                  <a:rPr lang="en-US" sz="1600" dirty="0"/>
                   <a:t>More info see M5_marking.md</a:t>
                 </a:r>
               </a:p>
@@ -8034,7 +8064,7 @@
             <p:spPr>
               <a:xfrm>
                 <a:off x="478180" y="723232"/>
-                <a:ext cx="11588314" cy="6147773"/>
+                <a:ext cx="11588314" cy="5830699"/>
               </a:xfrm>
               <a:prstGeom prst="rect">
                 <a:avLst/>
@@ -8042,7 +8072,7 @@
               <a:blipFill>
                 <a:blip r:embed="rId2"/>
                 <a:stretch>
-                  <a:fillRect l="-421" t="-595" b="-694"/>
+                  <a:fillRect l="-263" t="-314" r="-316" b="-418"/>
                 </a:stretch>
               </a:blipFill>
             </p:spPr>
@@ -8064,7 +8094,7 @@
     </p:spTree>
     <p:extLst>
       <p:ext uri="{BB962C8B-B14F-4D97-AF65-F5344CB8AC3E}">
-        <p14:creationId xmlns:p14="http://schemas.microsoft.com/office/powerpoint/2010/main" val="86247891"/>
+        <p14:creationId xmlns:p14="http://schemas.microsoft.com/office/powerpoint/2010/main" val="996172156"/>
       </p:ext>
     </p:extLst>
   </p:cSld>

</xml_diff>